<commit_message>
updated research_approach.tex Jun 25 15:08:57 MDT
</commit_message>
<xml_diff>
--- a/figures/workflow.pptx
+++ b/figures/workflow.pptx
@@ -104,6 +104,11 @@
       </a:defRPr>
     </a:lvl9pPr>
   </p:defaultTextStyle>
+  <p:extLst>
+    <p:ext uri="{EFAFB233-063F-42B5-8137-9DF3F51BA10A}">
+      <p15:sldGuideLst xmlns:p15="http://schemas.microsoft.com/office/powerpoint/2012/main"/>
+    </p:ext>
+  </p:extLst>
 </p:presentation>
 </file>
 
@@ -238,7 +243,7 @@
           <a:p>
             <a:fld id="{4BB78038-6CE9-420F-A6E0-1A49427688DC}" type="datetimeFigureOut">
               <a:rPr lang="en-US" smtClean="0"/>
-              <a:t>6/24/2018</a:t>
+              <a:t>6/25/2018</a:t>
             </a:fld>
             <a:endParaRPr lang="en-US"/>
           </a:p>
@@ -408,7 +413,7 @@
           <a:p>
             <a:fld id="{4BB78038-6CE9-420F-A6E0-1A49427688DC}" type="datetimeFigureOut">
               <a:rPr lang="en-US" smtClean="0"/>
-              <a:t>6/24/2018</a:t>
+              <a:t>6/25/2018</a:t>
             </a:fld>
             <a:endParaRPr lang="en-US"/>
           </a:p>
@@ -588,7 +593,7 @@
           <a:p>
             <a:fld id="{4BB78038-6CE9-420F-A6E0-1A49427688DC}" type="datetimeFigureOut">
               <a:rPr lang="en-US" smtClean="0"/>
-              <a:t>6/24/2018</a:t>
+              <a:t>6/25/2018</a:t>
             </a:fld>
             <a:endParaRPr lang="en-US"/>
           </a:p>
@@ -758,7 +763,7 @@
           <a:p>
             <a:fld id="{4BB78038-6CE9-420F-A6E0-1A49427688DC}" type="datetimeFigureOut">
               <a:rPr lang="en-US" smtClean="0"/>
-              <a:t>6/24/2018</a:t>
+              <a:t>6/25/2018</a:t>
             </a:fld>
             <a:endParaRPr lang="en-US"/>
           </a:p>
@@ -1004,7 +1009,7 @@
           <a:p>
             <a:fld id="{4BB78038-6CE9-420F-A6E0-1A49427688DC}" type="datetimeFigureOut">
               <a:rPr lang="en-US" smtClean="0"/>
-              <a:t>6/24/2018</a:t>
+              <a:t>6/25/2018</a:t>
             </a:fld>
             <a:endParaRPr lang="en-US"/>
           </a:p>
@@ -1236,7 +1241,7 @@
           <a:p>
             <a:fld id="{4BB78038-6CE9-420F-A6E0-1A49427688DC}" type="datetimeFigureOut">
               <a:rPr lang="en-US" smtClean="0"/>
-              <a:t>6/24/2018</a:t>
+              <a:t>6/25/2018</a:t>
             </a:fld>
             <a:endParaRPr lang="en-US"/>
           </a:p>
@@ -1603,7 +1608,7 @@
           <a:p>
             <a:fld id="{4BB78038-6CE9-420F-A6E0-1A49427688DC}" type="datetimeFigureOut">
               <a:rPr lang="en-US" smtClean="0"/>
-              <a:t>6/24/2018</a:t>
+              <a:t>6/25/2018</a:t>
             </a:fld>
             <a:endParaRPr lang="en-US"/>
           </a:p>
@@ -1721,7 +1726,7 @@
           <a:p>
             <a:fld id="{4BB78038-6CE9-420F-A6E0-1A49427688DC}" type="datetimeFigureOut">
               <a:rPr lang="en-US" smtClean="0"/>
-              <a:t>6/24/2018</a:t>
+              <a:t>6/25/2018</a:t>
             </a:fld>
             <a:endParaRPr lang="en-US"/>
           </a:p>
@@ -1816,7 +1821,7 @@
           <a:p>
             <a:fld id="{4BB78038-6CE9-420F-A6E0-1A49427688DC}" type="datetimeFigureOut">
               <a:rPr lang="en-US" smtClean="0"/>
-              <a:t>6/24/2018</a:t>
+              <a:t>6/25/2018</a:t>
             </a:fld>
             <a:endParaRPr lang="en-US"/>
           </a:p>
@@ -2093,7 +2098,7 @@
           <a:p>
             <a:fld id="{4BB78038-6CE9-420F-A6E0-1A49427688DC}" type="datetimeFigureOut">
               <a:rPr lang="en-US" smtClean="0"/>
-              <a:t>6/24/2018</a:t>
+              <a:t>6/25/2018</a:t>
             </a:fld>
             <a:endParaRPr lang="en-US"/>
           </a:p>
@@ -2346,7 +2351,7 @@
           <a:p>
             <a:fld id="{4BB78038-6CE9-420F-A6E0-1A49427688DC}" type="datetimeFigureOut">
               <a:rPr lang="en-US" smtClean="0"/>
-              <a:t>6/24/2018</a:t>
+              <a:t>6/25/2018</a:t>
             </a:fld>
             <a:endParaRPr lang="en-US"/>
           </a:p>
@@ -2559,7 +2564,7 @@
           <a:p>
             <a:fld id="{4BB78038-6CE9-420F-A6E0-1A49427688DC}" type="datetimeFigureOut">
               <a:rPr lang="en-US" smtClean="0"/>
-              <a:t>6/24/2018</a:t>
+              <a:t>6/25/2018</a:t>
             </a:fld>
             <a:endParaRPr lang="en-US"/>
           </a:p>
@@ -3002,7 +3007,7 @@
         </p:nvSpPr>
         <p:spPr>
           <a:xfrm>
-            <a:off x="2723695" y="1360425"/>
+            <a:off x="3385594" y="1383587"/>
             <a:ext cx="1410514" cy="338554"/>
           </a:xfrm>
           <a:prstGeom prst="rect">
@@ -3025,14 +3030,14 @@
       </p:sp>
       <p:sp>
         <p:nvSpPr>
-          <p:cNvPr id="6" name="TextBox 5"/>
+          <p:cNvPr id="7" name="TextBox 6"/>
           <p:cNvSpPr txBox="1"/>
           <p:nvPr/>
         </p:nvSpPr>
         <p:spPr>
           <a:xfrm>
-            <a:off x="4388063" y="1370436"/>
-            <a:ext cx="1409745" cy="338554"/>
+            <a:off x="5207787" y="1398272"/>
+            <a:ext cx="852798" cy="338554"/>
           </a:xfrm>
           <a:prstGeom prst="rect">
             <a:avLst/>
@@ -3047,36 +3052,6 @@
           <a:p>
             <a:r>
               <a:rPr lang="en-US" sz="1600" dirty="0" smtClean="0"/>
-              <a:t>Pre-processing</a:t>
-            </a:r>
-            <a:endParaRPr lang="en-US" sz="1600" dirty="0"/>
-          </a:p>
-        </p:txBody>
-      </p:sp>
-      <p:sp>
-        <p:nvSpPr>
-          <p:cNvPr id="7" name="TextBox 6"/>
-          <p:cNvSpPr txBox="1"/>
-          <p:nvPr/>
-        </p:nvSpPr>
-        <p:spPr>
-          <a:xfrm>
-            <a:off x="6545222" y="1370436"/>
-            <a:ext cx="852798" cy="338554"/>
-          </a:xfrm>
-          <a:prstGeom prst="rect">
-            <a:avLst/>
-          </a:prstGeom>
-          <a:noFill/>
-        </p:spPr>
-        <p:txBody>
-          <a:bodyPr wrap="none" rtlCol="0">
-            <a:spAutoFit/>
-          </a:bodyPr>
-          <a:lstStyle/>
-          <a:p>
-            <a:r>
-              <a:rPr lang="en-US" sz="1600" dirty="0" smtClean="0"/>
               <a:t>Analysis</a:t>
             </a:r>
             <a:endParaRPr lang="en-US" sz="1600" dirty="0"/>
@@ -3091,7 +3066,7 @@
         </p:nvSpPr>
         <p:spPr>
           <a:xfrm>
-            <a:off x="8212644" y="1360425"/>
+            <a:off x="8199103" y="1360425"/>
             <a:ext cx="1355371" cy="338554"/>
           </a:xfrm>
           <a:prstGeom prst="rect">
@@ -3163,8 +3138,8 @@
         </p:nvSpPr>
         <p:spPr>
           <a:xfrm>
-            <a:off x="2777433" y="1304013"/>
-            <a:ext cx="1363331" cy="469263"/>
+            <a:off x="3391024" y="1316032"/>
+            <a:ext cx="1427360" cy="510921"/>
           </a:xfrm>
           <a:prstGeom prst="rect">
             <a:avLst/>
@@ -3199,14 +3174,14 @@
       </p:sp>
       <p:sp>
         <p:nvSpPr>
-          <p:cNvPr id="13" name="Rectangle 12"/>
+          <p:cNvPr id="14" name="Rectangle 13"/>
           <p:cNvSpPr/>
           <p:nvPr/>
         </p:nvSpPr>
         <p:spPr>
           <a:xfrm>
-            <a:off x="4377782" y="1311812"/>
-            <a:ext cx="1363331" cy="469263"/>
+            <a:off x="5141902" y="1316032"/>
+            <a:ext cx="1033670" cy="512056"/>
           </a:xfrm>
           <a:prstGeom prst="rect">
             <a:avLst/>
@@ -3241,14 +3216,14 @@
       </p:sp>
       <p:sp>
         <p:nvSpPr>
-          <p:cNvPr id="14" name="Rectangle 13"/>
+          <p:cNvPr id="15" name="Rectangle 14"/>
           <p:cNvSpPr/>
           <p:nvPr/>
         </p:nvSpPr>
         <p:spPr>
           <a:xfrm>
-            <a:off x="6464411" y="1237316"/>
-            <a:ext cx="1033670" cy="583534"/>
+            <a:off x="8221379" y="1242178"/>
+            <a:ext cx="1346636" cy="584775"/>
           </a:xfrm>
           <a:prstGeom prst="rect">
             <a:avLst/>
@@ -3283,14 +3258,133 @@
       </p:sp>
       <p:sp>
         <p:nvSpPr>
-          <p:cNvPr id="15" name="Rectangle 14"/>
+          <p:cNvPr id="16" name="TextBox 15"/>
+          <p:cNvSpPr txBox="1"/>
+          <p:nvPr/>
+        </p:nvSpPr>
+        <p:spPr>
+          <a:xfrm>
+            <a:off x="2667830" y="2763722"/>
+            <a:ext cx="1410514" cy="338554"/>
+          </a:xfrm>
+          <a:prstGeom prst="rect">
+            <a:avLst/>
+          </a:prstGeom>
+          <a:noFill/>
+        </p:spPr>
+        <p:txBody>
+          <a:bodyPr wrap="none" rtlCol="0">
+            <a:spAutoFit/>
+          </a:bodyPr>
+          <a:lstStyle/>
+          <a:p>
+            <a:r>
+              <a:rPr lang="en-US" sz="1600" dirty="0" smtClean="0"/>
+              <a:t>Data recording</a:t>
+            </a:r>
+          </a:p>
+        </p:txBody>
+      </p:sp>
+      <p:sp>
+        <p:nvSpPr>
+          <p:cNvPr id="17" name="TextBox 16"/>
+          <p:cNvSpPr txBox="1"/>
+          <p:nvPr/>
+        </p:nvSpPr>
+        <p:spPr>
+          <a:xfrm>
+            <a:off x="4128366" y="2771933"/>
+            <a:ext cx="1409745" cy="338554"/>
+          </a:xfrm>
+          <a:prstGeom prst="rect">
+            <a:avLst/>
+          </a:prstGeom>
+          <a:noFill/>
+        </p:spPr>
+        <p:txBody>
+          <a:bodyPr wrap="square" rtlCol="0">
+            <a:spAutoFit/>
+          </a:bodyPr>
+          <a:lstStyle/>
+          <a:p>
+            <a:r>
+              <a:rPr lang="en-US" sz="1600" dirty="0" smtClean="0"/>
+              <a:t>Pre-processing</a:t>
+            </a:r>
+            <a:endParaRPr lang="en-US" sz="1600" dirty="0"/>
+          </a:p>
+        </p:txBody>
+      </p:sp>
+      <p:sp>
+        <p:nvSpPr>
+          <p:cNvPr id="18" name="TextBox 17"/>
+          <p:cNvSpPr txBox="1"/>
+          <p:nvPr/>
+        </p:nvSpPr>
+        <p:spPr>
+          <a:xfrm>
+            <a:off x="7083771" y="2780476"/>
+            <a:ext cx="852798" cy="338554"/>
+          </a:xfrm>
+          <a:prstGeom prst="rect">
+            <a:avLst/>
+          </a:prstGeom>
+          <a:noFill/>
+        </p:spPr>
+        <p:txBody>
+          <a:bodyPr wrap="none" rtlCol="0">
+            <a:spAutoFit/>
+          </a:bodyPr>
+          <a:lstStyle/>
+          <a:p>
+            <a:r>
+              <a:rPr lang="en-US" sz="1600" dirty="0" smtClean="0"/>
+              <a:t>Analysis</a:t>
+            </a:r>
+            <a:endParaRPr lang="en-US" sz="1600" dirty="0"/>
+          </a:p>
+        </p:txBody>
+      </p:sp>
+      <p:sp>
+        <p:nvSpPr>
+          <p:cNvPr id="19" name="TextBox 18"/>
+          <p:cNvSpPr txBox="1"/>
+          <p:nvPr/>
+        </p:nvSpPr>
+        <p:spPr>
+          <a:xfrm>
+            <a:off x="8636733" y="2777066"/>
+            <a:ext cx="1355371" cy="338554"/>
+          </a:xfrm>
+          <a:prstGeom prst="rect">
+            <a:avLst/>
+          </a:prstGeom>
+          <a:noFill/>
+        </p:spPr>
+        <p:txBody>
+          <a:bodyPr wrap="none" rtlCol="0">
+            <a:spAutoFit/>
+          </a:bodyPr>
+          <a:lstStyle/>
+          <a:p>
+            <a:r>
+              <a:rPr lang="en-US" sz="1600" dirty="0" smtClean="0"/>
+              <a:t>Interpretation</a:t>
+            </a:r>
+            <a:endParaRPr lang="en-US" sz="1600" dirty="0"/>
+          </a:p>
+        </p:txBody>
+      </p:sp>
+      <p:sp>
+        <p:nvSpPr>
+          <p:cNvPr id="21" name="Rectangle 20"/>
           <p:cNvSpPr/>
           <p:nvPr/>
         </p:nvSpPr>
         <p:spPr>
           <a:xfrm>
-            <a:off x="8221379" y="1242178"/>
-            <a:ext cx="1346636" cy="584775"/>
+            <a:off x="4154501" y="2657368"/>
+            <a:ext cx="1397403" cy="594493"/>
           </a:xfrm>
           <a:prstGeom prst="rect">
             <a:avLst/>
@@ -3325,133 +3419,14 @@
       </p:sp>
       <p:sp>
         <p:nvSpPr>
-          <p:cNvPr id="16" name="TextBox 15"/>
-          <p:cNvSpPr txBox="1"/>
-          <p:nvPr/>
-        </p:nvSpPr>
-        <p:spPr>
-          <a:xfrm>
-            <a:off x="2763640" y="3093588"/>
-            <a:ext cx="1410514" cy="338554"/>
-          </a:xfrm>
-          <a:prstGeom prst="rect">
-            <a:avLst/>
-          </a:prstGeom>
-          <a:noFill/>
-        </p:spPr>
-        <p:txBody>
-          <a:bodyPr wrap="none" rtlCol="0">
-            <a:spAutoFit/>
-          </a:bodyPr>
-          <a:lstStyle/>
-          <a:p>
-            <a:r>
-              <a:rPr lang="en-US" sz="1600" dirty="0" smtClean="0"/>
-              <a:t>Data recording</a:t>
-            </a:r>
-          </a:p>
-        </p:txBody>
-      </p:sp>
-      <p:sp>
-        <p:nvSpPr>
-          <p:cNvPr id="17" name="TextBox 16"/>
-          <p:cNvSpPr txBox="1"/>
-          <p:nvPr/>
-        </p:nvSpPr>
-        <p:spPr>
-          <a:xfrm>
-            <a:off x="4615138" y="2769791"/>
-            <a:ext cx="1409745" cy="338554"/>
-          </a:xfrm>
-          <a:prstGeom prst="rect">
-            <a:avLst/>
-          </a:prstGeom>
-          <a:noFill/>
-        </p:spPr>
-        <p:txBody>
-          <a:bodyPr wrap="square" rtlCol="0">
-            <a:spAutoFit/>
-          </a:bodyPr>
-          <a:lstStyle/>
-          <a:p>
-            <a:r>
-              <a:rPr lang="en-US" sz="1600" dirty="0" smtClean="0"/>
-              <a:t>Pre-processing</a:t>
-            </a:r>
-            <a:endParaRPr lang="en-US" sz="1600" dirty="0"/>
-          </a:p>
-        </p:txBody>
-      </p:sp>
-      <p:sp>
-        <p:nvSpPr>
-          <p:cNvPr id="18" name="TextBox 17"/>
-          <p:cNvSpPr txBox="1"/>
-          <p:nvPr/>
-        </p:nvSpPr>
-        <p:spPr>
-          <a:xfrm>
-            <a:off x="6545222" y="2769792"/>
-            <a:ext cx="852798" cy="338554"/>
-          </a:xfrm>
-          <a:prstGeom prst="rect">
-            <a:avLst/>
-          </a:prstGeom>
-          <a:noFill/>
-        </p:spPr>
-        <p:txBody>
-          <a:bodyPr wrap="none" rtlCol="0">
-            <a:spAutoFit/>
-          </a:bodyPr>
-          <a:lstStyle/>
-          <a:p>
-            <a:r>
-              <a:rPr lang="en-US" sz="1600" dirty="0" smtClean="0"/>
-              <a:t>Analysis</a:t>
-            </a:r>
-            <a:endParaRPr lang="en-US" sz="1600" dirty="0"/>
-          </a:p>
-        </p:txBody>
-      </p:sp>
-      <p:sp>
-        <p:nvSpPr>
-          <p:cNvPr id="19" name="TextBox 18"/>
-          <p:cNvSpPr txBox="1"/>
-          <p:nvPr/>
-        </p:nvSpPr>
-        <p:spPr>
-          <a:xfrm>
-            <a:off x="8207586" y="2769792"/>
-            <a:ext cx="1355371" cy="338554"/>
-          </a:xfrm>
-          <a:prstGeom prst="rect">
-            <a:avLst/>
-          </a:prstGeom>
-          <a:noFill/>
-        </p:spPr>
-        <p:txBody>
-          <a:bodyPr wrap="none" rtlCol="0">
-            <a:spAutoFit/>
-          </a:bodyPr>
-          <a:lstStyle/>
-          <a:p>
-            <a:r>
-              <a:rPr lang="en-US" sz="1600" dirty="0" smtClean="0"/>
-              <a:t>Interpretation</a:t>
-            </a:r>
-            <a:endParaRPr lang="en-US" sz="1600" dirty="0"/>
-          </a:p>
-        </p:txBody>
-      </p:sp>
-      <p:sp>
-        <p:nvSpPr>
-          <p:cNvPr id="21" name="Rectangle 20"/>
+          <p:cNvPr id="23" name="Rectangle 22"/>
           <p:cNvSpPr/>
           <p:nvPr/>
         </p:nvSpPr>
         <p:spPr>
           <a:xfrm>
-            <a:off x="4634210" y="2668171"/>
-            <a:ext cx="1363331" cy="594493"/>
+            <a:off x="8641101" y="2657366"/>
+            <a:ext cx="1346636" cy="584775"/>
           </a:xfrm>
           <a:prstGeom prst="rect">
             <a:avLst/>
@@ -3486,14 +3461,14 @@
       </p:sp>
       <p:sp>
         <p:nvSpPr>
-          <p:cNvPr id="23" name="Rectangle 22"/>
+          <p:cNvPr id="24" name="Rectangle 23"/>
           <p:cNvSpPr/>
           <p:nvPr/>
         </p:nvSpPr>
         <p:spPr>
           <a:xfrm>
-            <a:off x="8221379" y="2677889"/>
-            <a:ext cx="1346636" cy="584775"/>
+            <a:off x="7066512" y="2657366"/>
+            <a:ext cx="900136" cy="584775"/>
           </a:xfrm>
           <a:prstGeom prst="rect">
             <a:avLst/>
@@ -3528,20 +3503,24 @@
       </p:sp>
       <p:sp>
         <p:nvSpPr>
-          <p:cNvPr id="24" name="Rectangle 23"/>
+          <p:cNvPr id="25" name="Rectangle 24"/>
           <p:cNvSpPr/>
           <p:nvPr/>
         </p:nvSpPr>
         <p:spPr>
           <a:xfrm>
-            <a:off x="6478470" y="2668171"/>
-            <a:ext cx="1033670" cy="584775"/>
+            <a:off x="3178359" y="1220158"/>
+            <a:ext cx="3179838" cy="702415"/>
           </a:xfrm>
           <a:prstGeom prst="rect">
             <a:avLst/>
           </a:prstGeom>
           <a:noFill/>
-          <a:ln w="19050"/>
+          <a:ln w="19050">
+            <a:solidFill>
+              <a:srgbClr val="C00000"/>
+            </a:solidFill>
+          </a:ln>
         </p:spPr>
         <p:style>
           <a:lnRef idx="2">
@@ -3570,14 +3549,14 @@
       </p:sp>
       <p:sp>
         <p:nvSpPr>
-          <p:cNvPr id="25" name="Rectangle 24"/>
+          <p:cNvPr id="26" name="Rectangle 25"/>
           <p:cNvSpPr/>
           <p:nvPr/>
         </p:nvSpPr>
         <p:spPr>
           <a:xfrm>
-            <a:off x="2645815" y="1237315"/>
-            <a:ext cx="3151993" cy="905293"/>
+            <a:off x="2697354" y="2668172"/>
+            <a:ext cx="1401488" cy="573972"/>
           </a:xfrm>
           <a:prstGeom prst="rect">
             <a:avLst/>
@@ -3585,8 +3564,8 @@
           <a:noFill/>
           <a:ln w="19050">
             <a:solidFill>
-              <a:schemeClr val="accent6">
-                <a:lumMod val="50000"/>
+              <a:schemeClr val="accent5">
+                <a:lumMod val="75000"/>
               </a:schemeClr>
             </a:solidFill>
           </a:ln>
@@ -3618,101 +3597,14 @@
       </p:sp>
       <p:sp>
         <p:nvSpPr>
-          <p:cNvPr id="26" name="Rectangle 25"/>
-          <p:cNvSpPr/>
-          <p:nvPr/>
-        </p:nvSpPr>
-        <p:spPr>
-          <a:xfrm>
-            <a:off x="2678880" y="2374160"/>
-            <a:ext cx="1524492" cy="1057982"/>
-          </a:xfrm>
-          <a:prstGeom prst="rect">
-            <a:avLst/>
-          </a:prstGeom>
-          <a:noFill/>
-          <a:ln w="19050">
-            <a:solidFill>
-              <a:srgbClr val="C00000"/>
-            </a:solidFill>
-          </a:ln>
-        </p:spPr>
-        <p:style>
-          <a:lnRef idx="2">
-            <a:schemeClr val="accent1">
-              <a:shade val="50000"/>
-            </a:schemeClr>
-          </a:lnRef>
-          <a:fillRef idx="1">
-            <a:schemeClr val="accent1"/>
-          </a:fillRef>
-          <a:effectRef idx="0">
-            <a:schemeClr val="accent1"/>
-          </a:effectRef>
-          <a:fontRef idx="minor">
-            <a:schemeClr val="lt1"/>
-          </a:fontRef>
-        </p:style>
-        <p:txBody>
-          <a:bodyPr rtlCol="0" anchor="ctr"/>
-          <a:lstStyle/>
-          <a:p>
-            <a:pPr algn="ctr"/>
-            <a:endParaRPr lang="en-US"/>
-          </a:p>
-        </p:txBody>
-      </p:sp>
-      <p:sp>
-        <p:nvSpPr>
           <p:cNvPr id="28" name="Rectangle 27"/>
           <p:cNvSpPr/>
           <p:nvPr/>
         </p:nvSpPr>
         <p:spPr>
           <a:xfrm>
-            <a:off x="3630260" y="1773276"/>
+            <a:off x="5638223" y="2580421"/>
             <a:ext cx="1355436" cy="369332"/>
-          </a:xfrm>
-          <a:prstGeom prst="rect">
-            <a:avLst/>
-          </a:prstGeom>
-        </p:spPr>
-        <p:txBody>
-          <a:bodyPr wrap="none">
-            <a:spAutoFit/>
-          </a:bodyPr>
-          <a:lstStyle/>
-          <a:p>
-            <a:r>
-              <a:rPr lang="en-US" dirty="0" smtClean="0">
-                <a:solidFill>
-                  <a:schemeClr val="accent6">
-                    <a:lumMod val="50000"/>
-                  </a:schemeClr>
-                </a:solidFill>
-              </a:rPr>
-              <a:t>Spreadsheet</a:t>
-            </a:r>
-            <a:endParaRPr lang="en-US" dirty="0" smtClean="0">
-              <a:solidFill>
-                <a:schemeClr val="accent6">
-                  <a:lumMod val="50000"/>
-                </a:schemeClr>
-              </a:solidFill>
-            </a:endParaRPr>
-          </a:p>
-        </p:txBody>
-      </p:sp>
-      <p:sp>
-        <p:nvSpPr>
-          <p:cNvPr id="29" name="Rectangle 28"/>
-          <p:cNvSpPr/>
-          <p:nvPr/>
-        </p:nvSpPr>
-        <p:spPr>
-          <a:xfrm>
-            <a:off x="2770878" y="2410229"/>
-            <a:ext cx="1207831" cy="646331"/>
           </a:xfrm>
           <a:prstGeom prst="rect">
             <a:avLst/>
@@ -3730,81 +3622,8 @@
                   <a:srgbClr val="C00000"/>
                 </a:solidFill>
               </a:rPr>
-              <a:t>“tidy” data</a:t>
-            </a:r>
-          </a:p>
-          <a:p>
-            <a:r>
-              <a:rPr lang="en-US" dirty="0">
-                <a:solidFill>
-                  <a:srgbClr val="C00000"/>
-                </a:solidFill>
-              </a:rPr>
-              <a:t> </a:t>
-            </a:r>
-            <a:r>
-              <a:rPr lang="en-US" dirty="0" smtClean="0">
-                <a:solidFill>
-                  <a:srgbClr val="C00000"/>
-                </a:solidFill>
-              </a:rPr>
-              <a:t> </a:t>
-            </a:r>
-            <a:r>
-              <a:rPr lang="en-US" dirty="0" smtClean="0">
-                <a:solidFill>
-                  <a:srgbClr val="C00000"/>
-                </a:solidFill>
-              </a:rPr>
-              <a:t>structure</a:t>
-            </a:r>
-            <a:endParaRPr lang="en-US" dirty="0" smtClean="0">
-              <a:solidFill>
-                <a:srgbClr val="C00000"/>
-              </a:solidFill>
-            </a:endParaRPr>
-          </a:p>
-        </p:txBody>
-      </p:sp>
-      <p:sp>
-        <p:nvSpPr>
-          <p:cNvPr id="30" name="Rectangle 29"/>
-          <p:cNvSpPr/>
-          <p:nvPr/>
-        </p:nvSpPr>
-        <p:spPr>
-          <a:xfrm>
-            <a:off x="2763640" y="2418407"/>
-            <a:ext cx="1363331" cy="638154"/>
-          </a:xfrm>
-          <a:prstGeom prst="rect">
-            <a:avLst/>
-          </a:prstGeom>
-          <a:noFill/>
-          <a:ln w="19050"/>
-        </p:spPr>
-        <p:style>
-          <a:lnRef idx="2">
-            <a:schemeClr val="accent1">
-              <a:shade val="50000"/>
-            </a:schemeClr>
-          </a:lnRef>
-          <a:fillRef idx="1">
-            <a:schemeClr val="accent1"/>
-          </a:fillRef>
-          <a:effectRef idx="0">
-            <a:schemeClr val="accent1"/>
-          </a:effectRef>
-          <a:fontRef idx="minor">
-            <a:schemeClr val="lt1"/>
-          </a:fontRef>
-        </p:style>
-        <p:txBody>
-          <a:bodyPr rtlCol="0" anchor="ctr"/>
-          <a:lstStyle/>
-          <a:p>
-            <a:pPr algn="ctr"/>
-            <a:endParaRPr lang="en-US"/>
+              <a:t>Spreadsheet</a:t>
+            </a:r>
           </a:p>
         </p:txBody>
       </p:sp>
@@ -3816,8 +3635,8 @@
         </p:nvCxnSpPr>
         <p:spPr>
           <a:xfrm flipV="1">
-            <a:off x="1946901" y="1781075"/>
-            <a:ext cx="597516" cy="441861"/>
+            <a:off x="1946901" y="1698979"/>
+            <a:ext cx="1008301" cy="523958"/>
           </a:xfrm>
           <a:prstGeom prst="straightConnector1">
             <a:avLst/>
@@ -3887,16 +3706,16 @@
           <p:nvPr/>
         </p:nvCxnSpPr>
         <p:spPr>
-          <a:xfrm>
-            <a:off x="7601117" y="1538644"/>
-            <a:ext cx="441935" cy="1018"/>
+          <a:xfrm flipV="1">
+            <a:off x="6612044" y="1648967"/>
+            <a:ext cx="1333212" cy="1190"/>
           </a:xfrm>
           <a:prstGeom prst="straightConnector1">
             <a:avLst/>
           </a:prstGeom>
           <a:ln w="28575">
             <a:solidFill>
-              <a:schemeClr val="tx1"/>
+              <a:srgbClr val="C00000"/>
             </a:solidFill>
             <a:tailEnd type="triangle"/>
           </a:ln>
@@ -3924,44 +3743,8 @@
         </p:nvCxnSpPr>
         <p:spPr>
           <a:xfrm>
-            <a:off x="7580191" y="2977254"/>
-            <a:ext cx="527068" cy="0"/>
-          </a:xfrm>
-          <a:prstGeom prst="straightConnector1">
-            <a:avLst/>
-          </a:prstGeom>
-          <a:ln w="28575">
-            <a:solidFill>
-              <a:schemeClr val="tx1"/>
-            </a:solidFill>
-            <a:tailEnd type="triangle"/>
-          </a:ln>
-        </p:spPr>
-        <p:style>
-          <a:lnRef idx="1">
-            <a:schemeClr val="accent1"/>
-          </a:lnRef>
-          <a:fillRef idx="0">
-            <a:schemeClr val="accent1"/>
-          </a:fillRef>
-          <a:effectRef idx="0">
-            <a:schemeClr val="accent1"/>
-          </a:effectRef>
-          <a:fontRef idx="minor">
-            <a:schemeClr val="tx1"/>
-          </a:fontRef>
-        </p:style>
-      </p:cxnSp>
-      <p:cxnSp>
-        <p:nvCxnSpPr>
-          <p:cNvPr id="42" name="Straight Arrow Connector 41"/>
-          <p:cNvCxnSpPr/>
-          <p:nvPr/>
-        </p:nvCxnSpPr>
-        <p:spPr>
-          <a:xfrm>
-            <a:off x="5910705" y="1538644"/>
-            <a:ext cx="521890" cy="0"/>
+            <a:off x="8056760" y="2964818"/>
+            <a:ext cx="507120" cy="0"/>
           </a:xfrm>
           <a:prstGeom prst="straightConnector1">
             <a:avLst/>
@@ -3996,15 +3779,15 @@
         </p:nvCxnSpPr>
         <p:spPr>
           <a:xfrm>
-            <a:off x="6096011" y="2970276"/>
-            <a:ext cx="336584" cy="0"/>
+            <a:off x="5698407" y="2977254"/>
+            <a:ext cx="1235068" cy="0"/>
           </a:xfrm>
           <a:prstGeom prst="straightConnector1">
             <a:avLst/>
           </a:prstGeom>
           <a:ln w="28575">
             <a:solidFill>
-              <a:schemeClr val="tx1"/>
+              <a:srgbClr val="C00000"/>
             </a:solidFill>
             <a:tailEnd type="triangle"/>
           </a:ln>
@@ -4024,42 +3807,84 @@
           </a:fontRef>
         </p:style>
       </p:cxnSp>
-      <p:cxnSp>
-        <p:nvCxnSpPr>
-          <p:cNvPr id="55" name="Straight Arrow Connector 54"/>
-          <p:cNvCxnSpPr/>
+      <p:sp>
+        <p:nvSpPr>
+          <p:cNvPr id="35" name="Rectangle 34"/>
+          <p:cNvSpPr/>
           <p:nvPr/>
-        </p:nvCxnSpPr>
-        <p:spPr>
-          <a:xfrm>
-            <a:off x="4249247" y="2960558"/>
-            <a:ext cx="336584" cy="0"/>
-          </a:xfrm>
-          <a:prstGeom prst="straightConnector1">
+        </p:nvSpPr>
+        <p:spPr>
+          <a:xfrm>
+            <a:off x="2600076" y="2598547"/>
+            <a:ext cx="3021496" cy="702415"/>
+          </a:xfrm>
+          <a:prstGeom prst="rect">
             <a:avLst/>
           </a:prstGeom>
-          <a:ln w="28575">
+          <a:noFill/>
+          <a:ln w="19050">
             <a:solidFill>
-              <a:schemeClr val="tx1"/>
+              <a:srgbClr val="C00000"/>
             </a:solidFill>
-            <a:tailEnd type="triangle"/>
           </a:ln>
         </p:spPr>
         <p:style>
-          <a:lnRef idx="1">
-            <a:schemeClr val="accent1"/>
+          <a:lnRef idx="2">
+            <a:schemeClr val="accent1">
+              <a:shade val="50000"/>
+            </a:schemeClr>
           </a:lnRef>
-          <a:fillRef idx="0">
+          <a:fillRef idx="1">
             <a:schemeClr val="accent1"/>
           </a:fillRef>
           <a:effectRef idx="0">
             <a:schemeClr val="accent1"/>
           </a:effectRef>
           <a:fontRef idx="minor">
-            <a:schemeClr val="tx1"/>
+            <a:schemeClr val="lt1"/>
           </a:fontRef>
         </p:style>
-      </p:cxnSp>
+        <p:txBody>
+          <a:bodyPr rtlCol="0" anchor="ctr"/>
+          <a:lstStyle/>
+          <a:p>
+            <a:pPr algn="ctr"/>
+            <a:endParaRPr lang="en-US"/>
+          </a:p>
+        </p:txBody>
+      </p:sp>
+      <p:sp>
+        <p:nvSpPr>
+          <p:cNvPr id="39" name="Rectangle 38"/>
+          <p:cNvSpPr/>
+          <p:nvPr/>
+        </p:nvSpPr>
+        <p:spPr>
+          <a:xfrm>
+            <a:off x="6568331" y="1231161"/>
+            <a:ext cx="1355436" cy="369332"/>
+          </a:xfrm>
+          <a:prstGeom prst="rect">
+            <a:avLst/>
+          </a:prstGeom>
+        </p:spPr>
+        <p:txBody>
+          <a:bodyPr wrap="none">
+            <a:spAutoFit/>
+          </a:bodyPr>
+          <a:lstStyle/>
+          <a:p>
+            <a:r>
+              <a:rPr lang="en-US" dirty="0" smtClean="0">
+                <a:solidFill>
+                  <a:srgbClr val="C00000"/>
+                </a:solidFill>
+              </a:rPr>
+              <a:t>Spreadsheet</a:t>
+            </a:r>
+          </a:p>
+        </p:txBody>
+      </p:sp>
     </p:spTree>
     <p:extLst>
       <p:ext uri="{BB962C8B-B14F-4D97-AF65-F5344CB8AC3E}">
@@ -4070,6 +3895,13 @@
   <p:clrMapOvr>
     <a:masterClrMapping/>
   </p:clrMapOvr>
+  <p:timing>
+    <p:tnLst>
+      <p:par>
+        <p:cTn id="1" dur="indefinite" restart="never" nodeType="tmRoot"/>
+      </p:par>
+    </p:tnLst>
+  </p:timing>
 </p:sld>
 </file>
 

</xml_diff>